<commit_message>
Add link to slide deck
</commit_message>
<xml_diff>
--- a/docs/flow-typing.pptx
+++ b/docs/flow-typing.pptx
@@ -2012,6 +2012,90 @@
     <p:extLst>
       <p:ext uri="{BB962C8B-B14F-4D97-AF65-F5344CB8AC3E}">
         <p14:creationId xmlns:p14="http://schemas.microsoft.com/office/powerpoint/2010/main" val="732174740"/>
+      </p:ext>
+    </p:extLst>
+  </p:cSld>
+  <p:clrMapOvr>
+    <a:masterClrMapping/>
+  </p:clrMapOvr>
+</p:notes>
+</file>
+
+<file path=ppt/notesSlides/notesSlide22.xml><?xml version="1.0" encoding="utf-8"?>
+<p:notes xmlns:a="http://schemas.openxmlformats.org/drawingml/2006/main" xmlns:r="http://schemas.openxmlformats.org/officeDocument/2006/relationships" xmlns:p="http://schemas.openxmlformats.org/presentationml/2006/main">
+  <p:cSld>
+    <p:spTree>
+      <p:nvGrpSpPr>
+        <p:cNvPr id="1" name=""/>
+        <p:cNvGrpSpPr/>
+        <p:nvPr/>
+      </p:nvGrpSpPr>
+      <p:grpSpPr>
+        <a:xfrm>
+          <a:off x="0" y="0"/>
+          <a:ext cx="0" cy="0"/>
+          <a:chOff x="0" y="0"/>
+          <a:chExt cx="0" cy="0"/>
+        </a:xfrm>
+      </p:grpSpPr>
+      <p:sp>
+        <p:nvSpPr>
+          <p:cNvPr id="2" name="Slide Image Placeholder 1"/>
+          <p:cNvSpPr>
+            <a:spLocks noGrp="1" noRot="1" noChangeAspect="1"/>
+          </p:cNvSpPr>
+          <p:nvPr>
+            <p:ph type="sldImg"/>
+          </p:nvPr>
+        </p:nvSpPr>
+        <p:spPr/>
+      </p:sp>
+      <p:sp>
+        <p:nvSpPr>
+          <p:cNvPr id="3" name="Notes Placeholder 2"/>
+          <p:cNvSpPr>
+            <a:spLocks noGrp="1"/>
+          </p:cNvSpPr>
+          <p:nvPr>
+            <p:ph type="body" idx="1"/>
+          </p:nvPr>
+        </p:nvSpPr>
+        <p:spPr/>
+        <p:txBody>
+          <a:bodyPr/>
+          <a:lstStyle/>
+          <a:p>
+            <a:endParaRPr lang="en-US"/>
+          </a:p>
+        </p:txBody>
+      </p:sp>
+      <p:sp>
+        <p:nvSpPr>
+          <p:cNvPr id="4" name="Slide Number Placeholder 3"/>
+          <p:cNvSpPr>
+            <a:spLocks noGrp="1"/>
+          </p:cNvSpPr>
+          <p:nvPr>
+            <p:ph type="sldNum" sz="quarter" idx="10"/>
+          </p:nvPr>
+        </p:nvSpPr>
+        <p:spPr/>
+        <p:txBody>
+          <a:bodyPr/>
+          <a:lstStyle/>
+          <a:p>
+            <a:fld id="{22BF3EBF-B67E-40B1-9503-FDDD148EB03D}" type="slidenum">
+              <a:rPr lang="en-US" smtClean="0"/>
+              <a:t>34</a:t>
+            </a:fld>
+            <a:endParaRPr lang="en-US" dirty="0"/>
+          </a:p>
+        </p:txBody>
+      </p:sp>
+    </p:spTree>
+    <p:extLst>
+      <p:ext uri="{BB962C8B-B14F-4D97-AF65-F5344CB8AC3E}">
+        <p14:creationId xmlns:p14="http://schemas.microsoft.com/office/powerpoint/2010/main" val="1298575045"/>
       </p:ext>
     </p:extLst>
   </p:cSld>
@@ -4284,15 +4368,7 @@
           <a:p>
             <a:r>
               <a:rPr lang="en-US" sz="1600" dirty="0" smtClean="0"/>
-              <a:t>Near-identical </a:t>
-            </a:r>
-            <a:r>
-              <a:rPr lang="en-US" sz="1600" dirty="0" smtClean="0"/>
-              <a:t>type declaration syntax </a:t>
-            </a:r>
-            <a:r>
-              <a:rPr lang="en-US" sz="1600" dirty="0" smtClean="0"/>
-              <a:t/>
+              <a:t>Near-identical type declaration syntax </a:t>
             </a:r>
             <a:br>
               <a:rPr lang="en-US" sz="1600" dirty="0" smtClean="0"/>
@@ -4537,13 +4613,7 @@
               <a:rPr lang="en-US" sz="1200" dirty="0" smtClean="0">
                 <a:latin typeface="Consolas" panose="020B0609020204030204" pitchFamily="49" charset="0"/>
               </a:rPr>
-              <a:t> /</a:t>
-            </a:r>
-            <a:r>
-              <a:rPr lang="en-US" sz="1200" dirty="0" smtClean="0">
-                <a:latin typeface="Consolas" panose="020B0609020204030204" pitchFamily="49" charset="0"/>
-              </a:rPr>
-              <a:t> </a:t>
+              <a:t> / </a:t>
             </a:r>
             <a:r>
               <a:rPr lang="en-US" sz="1200" dirty="0" err="1" smtClean="0">
@@ -4600,9 +4670,6 @@
               </a:rPr>
               <a:t>Infers unknown types after considering types that “flow” through</a:t>
             </a:r>
-            <a:endParaRPr lang="en-US" sz="1200" dirty="0" smtClean="0">
-              <a:latin typeface="+mj-lt"/>
-            </a:endParaRPr>
           </a:p>
           <a:p>
             <a:endParaRPr lang="en-US" sz="2000" dirty="0" smtClean="0">
@@ -4767,7 +4834,6 @@
               <a:rPr lang="en-US" sz="1600" dirty="0" smtClean="0"/>
               <a:t>Adding type annotations improves coverage, but at diminishing cost</a:t>
             </a:r>
-            <a:endParaRPr lang="en-US" sz="1600" dirty="0" smtClean="0"/>
           </a:p>
           <a:p>
             <a:r>
@@ -5256,13 +5322,7 @@
               <a:rPr lang="en-US" sz="1600" dirty="0" smtClean="0">
                 <a:latin typeface="Consolas" panose="020B0609020204030204" pitchFamily="49" charset="0"/>
               </a:rPr>
-              <a:t>$ f</a:t>
-            </a:r>
-            <a:r>
-              <a:rPr lang="en-US" sz="1600" dirty="0" smtClean="0">
-                <a:latin typeface="Consolas" panose="020B0609020204030204" pitchFamily="49" charset="0"/>
-              </a:rPr>
-              <a:t>low </a:t>
+              <a:t>$ flow </a:t>
             </a:r>
             <a:r>
               <a:rPr lang="en-US" sz="1600" dirty="0">
@@ -11608,7 +11668,6 @@
               <a:rPr lang="en-US" dirty="0" smtClean="0"/>
               <a:t>External packages (ex: React)</a:t>
             </a:r>
-            <a:endParaRPr lang="en-US" dirty="0" smtClean="0"/>
           </a:p>
           <a:p>
             <a:pPr lvl="1"/>
@@ -11661,7 +11720,6 @@
               <a:rPr lang="en-US" dirty="0" smtClean="0"/>
               <a:t>Commit flow-typed modules to project repo</a:t>
             </a:r>
-            <a:endParaRPr lang="en-US" dirty="0" smtClean="0"/>
           </a:p>
           <a:p>
             <a:r>
@@ -11740,7 +11798,6 @@
               <a:rPr lang="en-US" dirty="0" smtClean="0"/>
               <a:t>Ship the .flow files along with your distributed source</a:t>
             </a:r>
-            <a:endParaRPr lang="en-US" dirty="0" smtClean="0"/>
           </a:p>
           <a:p>
             <a:endParaRPr lang="en-US" dirty="0" smtClean="0"/>
@@ -11772,19 +11829,7 @@
           <a:p>
             <a:r>
               <a:rPr lang="en-US" dirty="0" smtClean="0"/>
-              <a:t>Flow </a:t>
-            </a:r>
-            <a:r>
-              <a:rPr lang="en-US" dirty="0" smtClean="0"/>
-              <a:t>Typing </a:t>
-            </a:r>
-            <a:r>
-              <a:rPr lang="en-US" dirty="0" smtClean="0"/>
-              <a:t>– Typing </a:t>
-            </a:r>
-            <a:r>
-              <a:rPr lang="en-US" dirty="0" smtClean="0"/>
-              <a:t>Packages</a:t>
+              <a:t>Flow Typing – Typing Packages</a:t>
             </a:r>
             <a:endParaRPr lang="en-US" dirty="0"/>
           </a:p>
@@ -12019,11 +12064,7 @@
           <a:p>
             <a:r>
               <a:rPr lang="en-US" sz="1800" dirty="0" smtClean="0"/>
-              <a:t>Type </a:t>
-            </a:r>
-            <a:r>
-              <a:rPr lang="en-US" sz="1800" dirty="0" smtClean="0"/>
-              <a:t>Redux and component </a:t>
+              <a:t>Type Redux and component </a:t>
             </a:r>
             <a:r>
               <a:rPr lang="en-US" sz="1800" dirty="0"/>
@@ -12764,7 +12805,12 @@
             <p:ph sz="quarter" idx="10"/>
           </p:nvPr>
         </p:nvSpPr>
-        <p:spPr/>
+        <p:spPr>
+          <a:xfrm>
+            <a:off x="215901" y="1050372"/>
+            <a:ext cx="8853804" cy="3617345"/>
+          </a:xfrm>
+        </p:spPr>
         <p:txBody>
           <a:bodyPr/>
           <a:lstStyle/>
@@ -12773,154 +12819,180 @@
               <a:buNone/>
             </a:pPr>
             <a:r>
-              <a:rPr lang="en-US" dirty="0" smtClean="0"/>
+              <a:rPr lang="en-US" sz="1800" dirty="0" smtClean="0"/>
               <a:t>Contact</a:t>
             </a:r>
           </a:p>
           <a:p>
             <a:r>
-              <a:rPr lang="en-US" dirty="0" smtClean="0"/>
+              <a:rPr lang="en-US" sz="1800" dirty="0" smtClean="0"/>
               <a:t>GitHub:  </a:t>
             </a:r>
             <a:r>
-              <a:rPr lang="en-US" dirty="0" smtClean="0">
-                <a:hlinkClick r:id="rId2"/>
+              <a:rPr lang="en-US" sz="1800" dirty="0" smtClean="0">
+                <a:hlinkClick r:id="rId3"/>
               </a:rPr>
               <a:t>https</a:t>
             </a:r>
             <a:r>
-              <a:rPr lang="en-US" dirty="0">
-                <a:hlinkClick r:id="rId2"/>
+              <a:rPr lang="en-US" sz="1800" dirty="0">
+                <a:hlinkClick r:id="rId3"/>
               </a:rPr>
               <a:t>://</a:t>
             </a:r>
             <a:r>
-              <a:rPr lang="en-US" dirty="0" smtClean="0">
-                <a:hlinkClick r:id="rId2"/>
+              <a:rPr lang="en-US" sz="1800" dirty="0" smtClean="0">
+                <a:hlinkClick r:id="rId3"/>
               </a:rPr>
               <a:t>github.com/AlanMunson</a:t>
             </a:r>
-            <a:endParaRPr lang="en-US" dirty="0" smtClean="0"/>
-          </a:p>
-          <a:p>
-            <a:r>
-              <a:rPr lang="en-US" dirty="0"/>
+            <a:endParaRPr lang="en-US" sz="1800" dirty="0" smtClean="0"/>
+          </a:p>
+          <a:p>
+            <a:r>
+              <a:rPr lang="en-US" sz="1800" dirty="0"/>
               <a:t>Twitter: </a:t>
             </a:r>
             <a:r>
-              <a:rPr lang="en-US" dirty="0" smtClean="0"/>
+              <a:rPr lang="en-US" sz="1800" dirty="0" smtClean="0"/>
               <a:t> </a:t>
             </a:r>
             <a:r>
-              <a:rPr lang="en-US" dirty="0" smtClean="0">
-                <a:hlinkClick r:id="rId3"/>
+              <a:rPr lang="en-US" sz="1800" dirty="0" smtClean="0">
+                <a:hlinkClick r:id="rId4"/>
               </a:rPr>
               <a:t>@</a:t>
             </a:r>
             <a:r>
-              <a:rPr lang="en-US" dirty="0" err="1" smtClean="0">
-                <a:hlinkClick r:id="rId3"/>
+              <a:rPr lang="en-US" sz="1800" dirty="0" err="1" smtClean="0">
+                <a:hlinkClick r:id="rId4"/>
               </a:rPr>
               <a:t>AlanMunsonTech</a:t>
             </a:r>
-            <a:endParaRPr lang="en-US" dirty="0" smtClean="0"/>
-          </a:p>
-          <a:p>
-            <a:r>
-              <a:rPr lang="en-US" dirty="0"/>
+            <a:endParaRPr lang="en-US" sz="1800" dirty="0" smtClean="0"/>
+          </a:p>
+          <a:p>
+            <a:r>
+              <a:rPr lang="en-US" sz="1800" dirty="0"/>
               <a:t>LinkedIn: </a:t>
             </a:r>
             <a:r>
-              <a:rPr lang="en-US" dirty="0">
-                <a:hlinkClick r:id="rId4"/>
+              <a:rPr lang="en-US" sz="1800" dirty="0">
+                <a:hlinkClick r:id="rId5"/>
               </a:rPr>
               <a:t>https://www.linkedin.com/in/alanmunson</a:t>
             </a:r>
             <a:r>
-              <a:rPr lang="en-US" dirty="0" smtClean="0">
-                <a:hlinkClick r:id="rId4"/>
+              <a:rPr lang="en-US" sz="1800" dirty="0" smtClean="0">
+                <a:hlinkClick r:id="rId5"/>
               </a:rPr>
               <a:t>/</a:t>
             </a:r>
-            <a:endParaRPr lang="en-US" dirty="0" smtClean="0"/>
-          </a:p>
-          <a:p>
-            <a:r>
-              <a:rPr lang="en-US" dirty="0" smtClean="0"/>
+            <a:endParaRPr lang="en-US" sz="1800" dirty="0" smtClean="0"/>
+          </a:p>
+          <a:p>
+            <a:r>
+              <a:rPr lang="en-US" sz="1800" dirty="0" smtClean="0"/>
               <a:t>Email:    </a:t>
             </a:r>
             <a:r>
-              <a:rPr lang="en-US" dirty="0" smtClean="0">
-                <a:hlinkClick r:id="rId5"/>
+              <a:rPr lang="en-US" sz="1800" dirty="0" smtClean="0">
+                <a:hlinkClick r:id="rId6"/>
               </a:rPr>
               <a:t>amunson@costar.com</a:t>
             </a:r>
-            <a:endParaRPr lang="en-US" dirty="0" smtClean="0"/>
+            <a:endParaRPr lang="en-US" sz="1800" dirty="0" smtClean="0"/>
           </a:p>
           <a:p>
             <a:pPr marL="0" indent="0">
               <a:buNone/>
             </a:pPr>
             <a:r>
-              <a:rPr lang="en-US" dirty="0" smtClean="0"/>
+              <a:rPr lang="en-US" sz="1800" dirty="0" smtClean="0"/>
               <a:t>Interested in employment?</a:t>
             </a:r>
           </a:p>
           <a:p>
             <a:r>
-              <a:rPr lang="en-US" dirty="0" smtClean="0"/>
+              <a:rPr lang="en-US" sz="1800" dirty="0" smtClean="0"/>
               <a:t>Email me or </a:t>
             </a:r>
             <a:r>
-              <a:rPr lang="en-US" dirty="0"/>
+              <a:rPr lang="en-US" sz="1800" dirty="0"/>
               <a:t>Kyler Sullivan: </a:t>
             </a:r>
             <a:r>
-              <a:rPr lang="en-US" dirty="0" smtClean="0">
-                <a:hlinkClick r:id="rId6"/>
+              <a:rPr lang="en-US" sz="1800" dirty="0" smtClean="0">
+                <a:hlinkClick r:id="rId7"/>
               </a:rPr>
               <a:t>ksullivan@costar.com</a:t>
             </a:r>
-            <a:endParaRPr lang="en-US" dirty="0"/>
+            <a:endParaRPr lang="en-US" sz="1800" dirty="0"/>
           </a:p>
           <a:p>
             <a:pPr marL="0" indent="0">
               <a:buNone/>
             </a:pPr>
             <a:r>
-              <a:rPr lang="en-US" dirty="0" smtClean="0"/>
+              <a:rPr lang="en-US" sz="1800" dirty="0" smtClean="0"/>
               <a:t>Useful</a:t>
             </a:r>
-            <a:endParaRPr lang="en-US" dirty="0" smtClean="0"/>
-          </a:p>
-          <a:p>
-            <a:r>
-              <a:rPr lang="en-US" dirty="0" smtClean="0"/>
+          </a:p>
+          <a:p>
+            <a:r>
+              <a:rPr lang="en-US" sz="1800" dirty="0" smtClean="0"/>
               <a:t>Sample Flow project</a:t>
             </a:r>
             <a:r>
-              <a:rPr lang="en-US" dirty="0"/>
+              <a:rPr lang="en-US" sz="1800" dirty="0"/>
               <a:t>: </a:t>
             </a:r>
             <a:r>
-              <a:rPr lang="en-US" dirty="0">
-                <a:hlinkClick r:id="rId7"/>
+              <a:rPr lang="en-US" sz="1800" dirty="0">
+                <a:hlinkClick r:id="rId8"/>
               </a:rPr>
               <a:t>https://</a:t>
             </a:r>
             <a:r>
-              <a:rPr lang="en-US" dirty="0" smtClean="0">
-                <a:hlinkClick r:id="rId7"/>
+              <a:rPr lang="en-US" sz="1800" dirty="0" smtClean="0">
+                <a:hlinkClick r:id="rId8"/>
               </a:rPr>
               <a:t>github.com/AlanMunson/flow-examples</a:t>
             </a:r>
-            <a:endParaRPr lang="en-US" dirty="0" smtClean="0"/>
-          </a:p>
-          <a:p>
-            <a:r>
-              <a:rPr lang="en-US" dirty="0" smtClean="0"/>
+            <a:endParaRPr lang="en-US" sz="1800" dirty="0" smtClean="0"/>
+          </a:p>
+          <a:p>
+            <a:r>
+              <a:rPr lang="en-US" sz="1800" dirty="0" smtClean="0"/>
               <a:t>Slide deck: </a:t>
             </a:r>
+            <a:endParaRPr lang="en-US" sz="1800" dirty="0" smtClean="0"/>
+          </a:p>
+          <a:p>
+            <a:pPr marL="457200" lvl="1" indent="0">
+              <a:buNone/>
+            </a:pPr>
+            <a:r>
+              <a:rPr lang="en-US" sz="1600" dirty="0" smtClean="0">
+                <a:hlinkClick r:id="rId9"/>
+              </a:rPr>
+              <a:t>https</a:t>
+            </a:r>
+            <a:r>
+              <a:rPr lang="en-US" sz="1600" dirty="0">
+                <a:hlinkClick r:id="rId9"/>
+              </a:rPr>
+              <a:t>://</a:t>
+            </a:r>
+            <a:r>
+              <a:rPr lang="en-US" sz="1600" dirty="0" smtClean="0">
+                <a:hlinkClick r:id="rId9"/>
+              </a:rPr>
+              <a:t>github.com/AlanMunson/flow-examples/blob/master/docs/flow-typing.pptx</a:t>
+            </a:r>
+            <a:endParaRPr lang="en-US" sz="1600" dirty="0" smtClean="0"/>
+          </a:p>
+          <a:p>
             <a:endParaRPr lang="en-US" dirty="0" smtClean="0"/>
           </a:p>
           <a:p>
@@ -13072,11 +13144,7 @@
           <a:p>
             <a:r>
               <a:rPr lang="en-US" dirty="0" smtClean="0"/>
-              <a:t>Flow type </a:t>
-            </a:r>
-            <a:r>
-              <a:rPr lang="en-US" dirty="0" smtClean="0"/>
-              <a:t>system</a:t>
+              <a:t>Flow type system</a:t>
             </a:r>
           </a:p>
           <a:p>
@@ -13122,23 +13190,14 @@
           <a:p>
             <a:r>
               <a:rPr lang="en-US" dirty="0" smtClean="0"/>
-              <a:t>Flow </a:t>
-            </a:r>
-            <a:r>
-              <a:rPr lang="en-US" dirty="0" smtClean="0"/>
-              <a:t>with React / Redux</a:t>
-            </a:r>
-          </a:p>
-          <a:p>
-            <a:r>
-              <a:rPr lang="en-US" dirty="0" smtClean="0"/>
-              <a:t>Best </a:t>
-            </a:r>
-            <a:r>
-              <a:rPr lang="en-US" dirty="0" smtClean="0"/>
-              <a:t>Practices / Key Takeaways</a:t>
-            </a:r>
-            <a:endParaRPr lang="en-US" dirty="0" smtClean="0"/>
+              <a:t>Flow with React / Redux</a:t>
+            </a:r>
+          </a:p>
+          <a:p>
+            <a:r>
+              <a:rPr lang="en-US" dirty="0" smtClean="0"/>
+              <a:t>Best Practices / Key Takeaways</a:t>
+            </a:r>
           </a:p>
           <a:p>
             <a:endParaRPr lang="en-US" dirty="0" smtClean="0"/>

</xml_diff>

<commit_message>
Update CoStar bullet points
</commit_message>
<xml_diff>
--- a/docs/flow-typing.pptx
+++ b/docs/flow-typing.pptx
@@ -1682,8 +1682,27 @@
             </a:pPr>
             <a:r>
               <a:rPr lang="en-US" dirty="0" smtClean="0"/>
-              <a:t>Leading provider of commercial real estate analytics, information and online marketplaces</a:t>
-            </a:r>
+              <a:t>Leading provider of commercial real estate analytics, information and online </a:t>
+            </a:r>
+            <a:r>
+              <a:rPr lang="en-US" dirty="0" smtClean="0"/>
+              <a:t>marketplace</a:t>
+            </a:r>
+          </a:p>
+          <a:p>
+            <a:pPr marL="171450" indent="-171450">
+              <a:buFont typeface="Arial" panose="020B0604020202020204" pitchFamily="34" charset="0"/>
+              <a:buChar char="•"/>
+            </a:pPr>
+            <a:r>
+              <a:rPr lang="en-US" dirty="0" smtClean="0"/>
+              <a:t>Named Forbes Fastest </a:t>
+            </a:r>
+            <a:r>
+              <a:rPr lang="en-US" smtClean="0"/>
+              <a:t>growing company 2018 </a:t>
+            </a:r>
+            <a:endParaRPr lang="en-US" dirty="0" smtClean="0"/>
           </a:p>
           <a:p>
             <a:pPr marL="171450" indent="-171450">
@@ -2065,7 +2084,7 @@
           <a:bodyPr/>
           <a:lstStyle/>
           <a:p>
-            <a:endParaRPr lang="en-US"/>
+            <a:endParaRPr lang="en-US" dirty="0"/>
           </a:p>
         </p:txBody>
       </p:sp>

</xml_diff>